<commit_message>
Correcção de alguns erros no ppt
</commit_message>
<xml_diff>
--- a/docs/fase2/relatorio/myStreet.pptx
+++ b/docs/fase2/relatorio/myStreet.pptx
@@ -274,6 +274,7 @@
           <a:p>
             <a:fld id="{588C7687-5EDF-4AA9-BD1C-81402CE562A2}" type="datetimeFigureOut">
               <a:rPr lang="pt-PT" smtClean="0"/>
+              <a:pPr/>
               <a:t>16-04-2013</a:t>
             </a:fld>
             <a:endParaRPr lang="pt-PT"/>
@@ -1020,6 +1021,7 @@
           <a:p>
             <a:fld id="{9006E873-8FB2-4696-A080-76C8B79323E9}" type="slidenum">
               <a:rPr lang="pt-PT" smtClean="0"/>
+              <a:pPr/>
               <a:t>‹nº›</a:t>
             </a:fld>
             <a:endParaRPr lang="pt-PT"/>
@@ -1143,6 +1145,7 @@
           <a:p>
             <a:fld id="{588C7687-5EDF-4AA9-BD1C-81402CE562A2}" type="datetimeFigureOut">
               <a:rPr lang="pt-PT" smtClean="0"/>
+              <a:pPr/>
               <a:t>16-04-2013</a:t>
             </a:fld>
             <a:endParaRPr lang="pt-PT"/>
@@ -1185,6 +1188,7 @@
           <a:p>
             <a:fld id="{9006E873-8FB2-4696-A080-76C8B79323E9}" type="slidenum">
               <a:rPr lang="pt-PT" smtClean="0"/>
+              <a:pPr/>
               <a:t>‹nº›</a:t>
             </a:fld>
             <a:endParaRPr lang="pt-PT"/>
@@ -1318,6 +1322,7 @@
           <a:p>
             <a:fld id="{588C7687-5EDF-4AA9-BD1C-81402CE562A2}" type="datetimeFigureOut">
               <a:rPr lang="pt-PT" smtClean="0"/>
+              <a:pPr/>
               <a:t>16-04-2013</a:t>
             </a:fld>
             <a:endParaRPr lang="pt-PT"/>
@@ -1360,6 +1365,7 @@
           <a:p>
             <a:fld id="{9006E873-8FB2-4696-A080-76C8B79323E9}" type="slidenum">
               <a:rPr lang="pt-PT" smtClean="0"/>
+              <a:pPr/>
               <a:t>‹nº›</a:t>
             </a:fld>
             <a:endParaRPr lang="pt-PT"/>
@@ -1488,6 +1494,7 @@
           <a:p>
             <a:fld id="{588C7687-5EDF-4AA9-BD1C-81402CE562A2}" type="datetimeFigureOut">
               <a:rPr lang="pt-PT" smtClean="0"/>
+              <a:pPr/>
               <a:t>16-04-2013</a:t>
             </a:fld>
             <a:endParaRPr lang="pt-PT"/>
@@ -1511,6 +1518,7 @@
           <a:p>
             <a:fld id="{9006E873-8FB2-4696-A080-76C8B79323E9}" type="slidenum">
               <a:rPr lang="pt-PT" smtClean="0"/>
+              <a:pPr/>
               <a:t>‹nº›</a:t>
             </a:fld>
             <a:endParaRPr lang="pt-PT"/>
@@ -1698,6 +1706,7 @@
           <a:p>
             <a:fld id="{588C7687-5EDF-4AA9-BD1C-81402CE562A2}" type="datetimeFigureOut">
               <a:rPr lang="pt-PT" smtClean="0"/>
+              <a:pPr/>
               <a:t>16-04-2013</a:t>
             </a:fld>
             <a:endParaRPr lang="pt-PT"/>
@@ -2441,6 +2450,7 @@
           <a:p>
             <a:fld id="{9006E873-8FB2-4696-A080-76C8B79323E9}" type="slidenum">
               <a:rPr lang="pt-PT" smtClean="0"/>
+              <a:pPr/>
               <a:t>‹nº›</a:t>
             </a:fld>
             <a:endParaRPr lang="pt-PT"/>
@@ -2512,6 +2522,7 @@
           <a:p>
             <a:fld id="{588C7687-5EDF-4AA9-BD1C-81402CE562A2}" type="datetimeFigureOut">
               <a:rPr lang="pt-PT" smtClean="0"/>
+              <a:pPr/>
               <a:t>16-04-2013</a:t>
             </a:fld>
             <a:endParaRPr lang="pt-PT"/>
@@ -2554,6 +2565,7 @@
           <a:p>
             <a:fld id="{9006E873-8FB2-4696-A080-76C8B79323E9}" type="slidenum">
               <a:rPr lang="pt-PT" smtClean="0"/>
+              <a:pPr/>
               <a:t>‹nº›</a:t>
             </a:fld>
             <a:endParaRPr lang="pt-PT"/>
@@ -2748,6 +2760,7 @@
           <a:p>
             <a:fld id="{588C7687-5EDF-4AA9-BD1C-81402CE562A2}" type="datetimeFigureOut">
               <a:rPr lang="pt-PT" smtClean="0"/>
+              <a:pPr/>
               <a:t>16-04-2013</a:t>
             </a:fld>
             <a:endParaRPr lang="pt-PT"/>
@@ -2790,6 +2803,7 @@
           <a:p>
             <a:fld id="{9006E873-8FB2-4696-A080-76C8B79323E9}" type="slidenum">
               <a:rPr lang="pt-PT" smtClean="0"/>
+              <a:pPr/>
               <a:t>‹nº›</a:t>
             </a:fld>
             <a:endParaRPr lang="pt-PT"/>
@@ -3071,6 +3085,7 @@
           <a:p>
             <a:fld id="{588C7687-5EDF-4AA9-BD1C-81402CE562A2}" type="datetimeFigureOut">
               <a:rPr lang="pt-PT" smtClean="0"/>
+              <a:pPr/>
               <a:t>16-04-2013</a:t>
             </a:fld>
             <a:endParaRPr lang="pt-PT"/>
@@ -3094,6 +3109,7 @@
           <a:p>
             <a:fld id="{9006E873-8FB2-4696-A080-76C8B79323E9}" type="slidenum">
               <a:rPr lang="pt-PT" smtClean="0"/>
+              <a:pPr/>
               <a:t>‹nº›</a:t>
             </a:fld>
             <a:endParaRPr lang="pt-PT"/>
@@ -3161,6 +3177,7 @@
           <a:p>
             <a:fld id="{588C7687-5EDF-4AA9-BD1C-81402CE562A2}" type="datetimeFigureOut">
               <a:rPr lang="pt-PT" smtClean="0"/>
+              <a:pPr/>
               <a:t>16-04-2013</a:t>
             </a:fld>
             <a:endParaRPr lang="pt-PT"/>
@@ -3203,6 +3220,7 @@
           <a:p>
             <a:fld id="{9006E873-8FB2-4696-A080-76C8B79323E9}" type="slidenum">
               <a:rPr lang="pt-PT" smtClean="0"/>
+              <a:pPr/>
               <a:t>‹nº›</a:t>
             </a:fld>
             <a:endParaRPr lang="pt-PT"/>
@@ -3678,6 +3696,7 @@
           <a:p>
             <a:fld id="{588C7687-5EDF-4AA9-BD1C-81402CE562A2}" type="datetimeFigureOut">
               <a:rPr lang="pt-PT" smtClean="0"/>
+              <a:pPr/>
               <a:t>16-04-2013</a:t>
             </a:fld>
             <a:endParaRPr lang="pt-PT"/>
@@ -3701,6 +3720,7 @@
           <a:p>
             <a:fld id="{9006E873-8FB2-4696-A080-76C8B79323E9}" type="slidenum">
               <a:rPr lang="pt-PT" smtClean="0"/>
+              <a:pPr/>
               <a:t>‹nº›</a:t>
             </a:fld>
             <a:endParaRPr lang="pt-PT"/>
@@ -4189,6 +4209,7 @@
           <a:p>
             <a:fld id="{588C7687-5EDF-4AA9-BD1C-81402CE562A2}" type="datetimeFigureOut">
               <a:rPr lang="pt-PT" smtClean="0"/>
+              <a:pPr/>
               <a:t>16-04-2013</a:t>
             </a:fld>
             <a:endParaRPr lang="pt-PT"/>
@@ -4212,6 +4233,7 @@
           <a:p>
             <a:fld id="{9006E873-8FB2-4696-A080-76C8B79323E9}" type="slidenum">
               <a:rPr lang="pt-PT" smtClean="0"/>
+              <a:pPr/>
               <a:t>‹nº›</a:t>
             </a:fld>
             <a:endParaRPr lang="pt-PT"/>
@@ -4434,6 +4456,7 @@
           <a:p>
             <a:fld id="{588C7687-5EDF-4AA9-BD1C-81402CE562A2}" type="datetimeFigureOut">
               <a:rPr lang="pt-PT" smtClean="0"/>
+              <a:pPr/>
               <a:t>16-04-2013</a:t>
             </a:fld>
             <a:endParaRPr lang="pt-PT"/>
@@ -4710,6 +4733,7 @@
           <a:p>
             <a:fld id="{9006E873-8FB2-4696-A080-76C8B79323E9}" type="slidenum">
               <a:rPr lang="pt-PT" smtClean="0"/>
+              <a:pPr/>
               <a:t>‹nº›</a:t>
             </a:fld>
             <a:endParaRPr lang="pt-PT"/>
@@ -5056,11 +5080,7 @@
           <a:p>
             <a:r>
               <a:rPr lang="pt-PT" dirty="0" err="1" smtClean="0"/>
-              <a:t>m</a:t>
-            </a:r>
-            <a:r>
-              <a:rPr lang="pt-PT" dirty="0" err="1" smtClean="0"/>
-              <a:t>yStreet</a:t>
+              <a:t>myStreet</a:t>
             </a:r>
             <a:endParaRPr lang="pt-PT" dirty="0"/>
           </a:p>
@@ -5568,12 +5588,8 @@
               <a:t>UML – D.A. – Comentar </a:t>
             </a:r>
             <a:r>
-              <a:rPr lang="pt-PT" dirty="0" err="1" smtClean="0"/>
-              <a:t>Ocurrência</a:t>
-            </a:r>
-            <a:r>
               <a:rPr lang="pt-PT" dirty="0" smtClean="0"/>
-              <a:t> </a:t>
+              <a:t>Ocorrência </a:t>
             </a:r>
             <a:endParaRPr lang="pt-PT" dirty="0"/>
           </a:p>
@@ -5647,8 +5663,8 @@
               <a:t>UML – D.A. – Criar </a:t>
             </a:r>
             <a:r>
-              <a:rPr lang="pt-PT" dirty="0" err="1" smtClean="0"/>
-              <a:t>Ocurrência</a:t>
+              <a:rPr lang="pt-PT" dirty="0" smtClean="0"/>
+              <a:t>Ocorrência</a:t>
             </a:r>
             <a:endParaRPr lang="pt-PT" dirty="0"/>
           </a:p>
@@ -5793,8 +5809,8 @@
               <a:t>UML – D.A. – Procurar </a:t>
             </a:r>
             <a:r>
-              <a:rPr lang="pt-PT" dirty="0" err="1" smtClean="0"/>
-              <a:t>Ocurrências</a:t>
+              <a:rPr lang="pt-PT" dirty="0" smtClean="0"/>
+              <a:t>Ocorrências</a:t>
             </a:r>
             <a:endParaRPr lang="pt-PT" dirty="0"/>
           </a:p>
@@ -6040,12 +6056,8 @@
               <a:t>UML – D.S. – Classificar </a:t>
             </a:r>
             <a:r>
-              <a:rPr lang="pt-PT" dirty="0" err="1" smtClean="0"/>
-              <a:t>Ocurrência</a:t>
-            </a:r>
-            <a:r>
               <a:rPr lang="pt-PT" dirty="0" smtClean="0"/>
-              <a:t> </a:t>
+              <a:t>Ocorrência </a:t>
             </a:r>
             <a:endParaRPr lang="pt-PT" dirty="0"/>
           </a:p>
@@ -6116,15 +6128,11 @@
           <a:p>
             <a:r>
               <a:rPr lang="pt-PT" dirty="0" smtClean="0"/>
-              <a:t>UML – D.S. </a:t>
+              <a:t>UML – D.S. – Comentar </a:t>
             </a:r>
             <a:r>
               <a:rPr lang="pt-PT" dirty="0" smtClean="0"/>
-              <a:t>– Comentar </a:t>
-            </a:r>
-            <a:r>
-              <a:rPr lang="pt-PT" dirty="0" err="1" smtClean="0"/>
-              <a:t>Ocurrência</a:t>
+              <a:t>Ocorrência</a:t>
             </a:r>
             <a:endParaRPr lang="pt-PT" dirty="0"/>
           </a:p>
@@ -6195,15 +6203,11 @@
           <a:p>
             <a:r>
               <a:rPr lang="pt-PT" dirty="0" smtClean="0"/>
-              <a:t>UML – D.S. </a:t>
+              <a:t>UML – D.S. – Consultar </a:t>
             </a:r>
             <a:r>
               <a:rPr lang="pt-PT" dirty="0" smtClean="0"/>
-              <a:t>– Consultar </a:t>
-            </a:r>
-            <a:r>
-              <a:rPr lang="pt-PT" dirty="0" err="1" smtClean="0"/>
-              <a:t>Estatisticas</a:t>
+              <a:t>Estatísticas</a:t>
             </a:r>
             <a:endParaRPr lang="pt-PT" dirty="0"/>
           </a:p>
@@ -6274,15 +6278,11 @@
           <a:p>
             <a:r>
               <a:rPr lang="pt-PT" dirty="0" smtClean="0"/>
-              <a:t>UML – D.S. </a:t>
+              <a:t>UML – D.S. – Consultar </a:t>
             </a:r>
             <a:r>
               <a:rPr lang="pt-PT" dirty="0" smtClean="0"/>
-              <a:t>– Consultar </a:t>
-            </a:r>
-            <a:r>
-              <a:rPr lang="pt-PT" dirty="0" err="1" smtClean="0"/>
-              <a:t>Ocurrências</a:t>
+              <a:t>Ocorrências</a:t>
             </a:r>
             <a:endParaRPr lang="pt-PT" dirty="0"/>
           </a:p>
@@ -6353,11 +6353,7 @@
           <a:p>
             <a:r>
               <a:rPr lang="pt-PT" dirty="0" smtClean="0"/>
-              <a:t>UML – D.S. </a:t>
-            </a:r>
-            <a:r>
-              <a:rPr lang="pt-PT" dirty="0" smtClean="0"/>
-              <a:t>– Criar Perfil</a:t>
+              <a:t>UML – D.S. – Criar Perfil</a:t>
             </a:r>
             <a:endParaRPr lang="pt-PT" dirty="0"/>
           </a:p>
@@ -6428,11 +6424,7 @@
           <a:p>
             <a:r>
               <a:rPr lang="pt-PT" dirty="0" smtClean="0"/>
-              <a:t>UML – D.S. - </a:t>
-            </a:r>
-            <a:r>
-              <a:rPr lang="pt-PT" dirty="0" smtClean="0"/>
-              <a:t>Definir Funcionários</a:t>
+              <a:t>UML – D.S. - Definir Funcionários</a:t>
             </a:r>
             <a:endParaRPr lang="pt-PT" dirty="0"/>
           </a:p>
@@ -6503,11 +6495,7 @@
           <a:p>
             <a:r>
               <a:rPr lang="pt-PT" dirty="0" smtClean="0"/>
-              <a:t>UML – D.S. </a:t>
-            </a:r>
-            <a:r>
-              <a:rPr lang="pt-PT" dirty="0" smtClean="0"/>
-              <a:t>– Editar Perfil</a:t>
+              <a:t>UML – D.S. – Editar Perfil</a:t>
             </a:r>
             <a:endParaRPr lang="pt-PT" dirty="0"/>
           </a:p>
@@ -6578,15 +6566,11 @@
           <a:p>
             <a:r>
               <a:rPr lang="pt-PT" dirty="0" smtClean="0"/>
-              <a:t>UML – D.S. </a:t>
+              <a:t>UML – D.S. – Fechar </a:t>
             </a:r>
             <a:r>
               <a:rPr lang="pt-PT" dirty="0" smtClean="0"/>
-              <a:t>– Fechar </a:t>
-            </a:r>
-            <a:r>
-              <a:rPr lang="pt-PT" dirty="0" err="1" smtClean="0"/>
-              <a:t>Ocurrência</a:t>
+              <a:t>Ocorrência</a:t>
             </a:r>
             <a:endParaRPr lang="pt-PT" dirty="0"/>
           </a:p>
@@ -6657,11 +6641,7 @@
           <a:p>
             <a:r>
               <a:rPr lang="pt-PT" dirty="0" smtClean="0"/>
-              <a:t>UML – D.S. - </a:t>
-            </a:r>
-            <a:r>
-              <a:rPr lang="pt-PT" dirty="0" smtClean="0"/>
-              <a:t>Login</a:t>
+              <a:t>UML – D.S. - Login</a:t>
             </a:r>
             <a:endParaRPr lang="pt-PT" dirty="0"/>
           </a:p>
@@ -6775,7 +6755,6 @@
               <a:rPr lang="pt-PT" dirty="0" smtClean="0"/>
               <a:t>Promover debates.</a:t>
             </a:r>
-            <a:endParaRPr lang="pt-PT" dirty="0" smtClean="0"/>
           </a:p>
         </p:txBody>
       </p:sp>
@@ -6821,15 +6800,11 @@
           <a:p>
             <a:r>
               <a:rPr lang="pt-PT" dirty="0" smtClean="0"/>
-              <a:t>UML – D.S. </a:t>
-            </a:r>
-            <a:r>
-              <a:rPr lang="pt-PT" dirty="0" smtClean="0"/>
-              <a:t>– Realizar </a:t>
+              <a:t>UML – D.S. – Realizar </a:t>
             </a:r>
             <a:r>
               <a:rPr lang="pt-PT" dirty="0" err="1" smtClean="0"/>
-              <a:t>Updates</a:t>
+              <a:t>Actualizações</a:t>
             </a:r>
             <a:endParaRPr lang="pt-PT" dirty="0"/>
           </a:p>
@@ -6900,15 +6875,15 @@
           <a:p>
             <a:r>
               <a:rPr lang="pt-PT" dirty="0" smtClean="0"/>
-              <a:t>UML – D.S. </a:t>
-            </a:r>
-            <a:r>
-              <a:rPr lang="pt-PT" dirty="0" smtClean="0"/>
-              <a:t>– Reportar </a:t>
-            </a:r>
-            <a:r>
-              <a:rPr lang="pt-PT" dirty="0" err="1" smtClean="0"/>
-              <a:t>Ocurrência</a:t>
+              <a:t>UML – D.S. – </a:t>
+            </a:r>
+            <a:r>
+              <a:rPr lang="pt-PT" smtClean="0"/>
+              <a:t>Reportar </a:t>
+            </a:r>
+            <a:r>
+              <a:rPr lang="pt-PT" smtClean="0"/>
+              <a:t>Ocorrência</a:t>
             </a:r>
             <a:endParaRPr lang="pt-PT" dirty="0"/>
           </a:p>

</xml_diff>